<commit_message>
Enforce 13-word limit for Solution Overview sub-items in NVIDIA briefings
- Updated all sub-items in Solution Overview slides to be less than 13 words including title text
- DGX SuperPOD: Condensed 4 sub-items (16→12, 14→10, 13→8, 13→11 words)
- GPU Compute Cluster: Condensed 3 sub-items (15→12, 14→11, 14→12 words)
- Omniverse Enterprise: Condensed 3 sub-items (16→11, 16→11, 14→10 words)
- Removed redundant phrases while preserving technical accuracy
- All 18 sub-items now meet the <13 word requirement
- Regenerated all presentations with updated content
</commit_message>
<xml_diff>
--- a/solutions/nvidia/ai/dgx-superpod/presales/solution-briefing.pptx
+++ b/solutions/nvidia/ai/dgx-superpod/presales/solution-briefing.pptx
@@ -4814,13 +4814,13 @@
           <a:p>
             <a:pPr lvl="1"/>
             <a:r>
-              <a:t>8x NVIDIA DGX H100 systems each with 8x H100 80GB Tensor Core GPUs (64 GPUs total)</a:t>
+              <a:t>8x NVIDIA DGX H100 systems with 8x H100 80GB GPUs (64 total)</a:t>
             </a:r>
           </a:p>
           <a:p>
             <a:pPr lvl="1"/>
             <a:r>
-              <a:t>32 petaFLOPS FP8 AI performance and 5.12 TB GPU memory for large model training</a:t>
+              <a:t>32 petaFLOPS FP8 AI performance and 5.12 TB GPU memory</a:t>
             </a:r>
           </a:p>
           <a:p>
@@ -4845,13 +4845,13 @@
           <a:p>
             <a:pPr lvl="1"/>
             <a:r>
-              <a:t>1 PB NVMe all-flash storage with 14 GB/s throughput for dataset streaming</a:t>
+              <a:t>1 PB NVMe storage with 14 GB/s throughput</a:t>
             </a:r>
           </a:p>
           <a:p>
             <a:pPr lvl="1"/>
             <a:r>
-              <a:t>Base Command Manager for orchestration with enterprise 24x7 support and 4-hour SLA</a:t>
+              <a:t>Base Command Manager with enterprise 24x7 support and 4-hour SLA</a:t>
             </a:r>
           </a:p>
         </p:txBody>

</xml_diff>